<commit_message>
updating with final files
</commit_message>
<xml_diff>
--- a/Figures/LochVale/formatting.pptx
+++ b/Figures/LochVale/formatting.pptx
@@ -6,6 +6,7 @@
   </p:sldMasterIdLst>
   <p:sldIdLst>
     <p:sldId id="256" r:id="rId2"/>
+    <p:sldId id="257" r:id="rId3"/>
   </p:sldIdLst>
   <p:sldSz cx="12192000" cy="6858000"/>
   <p:notesSz cx="6858000" cy="9144000"/>
@@ -270,7 +271,7 @@
           <a:p>
             <a:fld id="{78F4CBAB-97FC-4A74-BBCB-0F18100BA447}" type="datetimeFigureOut">
               <a:rPr lang="en-US" smtClean="0"/>
-              <a:t>6/10/2024</a:t>
+              <a:t>8/28/2024</a:t>
             </a:fld>
             <a:endParaRPr lang="en-US"/>
           </a:p>
@@ -468,7 +469,7 @@
           <a:p>
             <a:fld id="{78F4CBAB-97FC-4A74-BBCB-0F18100BA447}" type="datetimeFigureOut">
               <a:rPr lang="en-US" smtClean="0"/>
-              <a:t>6/10/2024</a:t>
+              <a:t>8/28/2024</a:t>
             </a:fld>
             <a:endParaRPr lang="en-US"/>
           </a:p>
@@ -676,7 +677,7 @@
           <a:p>
             <a:fld id="{78F4CBAB-97FC-4A74-BBCB-0F18100BA447}" type="datetimeFigureOut">
               <a:rPr lang="en-US" smtClean="0"/>
-              <a:t>6/10/2024</a:t>
+              <a:t>8/28/2024</a:t>
             </a:fld>
             <a:endParaRPr lang="en-US"/>
           </a:p>
@@ -874,7 +875,7 @@
           <a:p>
             <a:fld id="{78F4CBAB-97FC-4A74-BBCB-0F18100BA447}" type="datetimeFigureOut">
               <a:rPr lang="en-US" smtClean="0"/>
-              <a:t>6/10/2024</a:t>
+              <a:t>8/28/2024</a:t>
             </a:fld>
             <a:endParaRPr lang="en-US"/>
           </a:p>
@@ -1149,7 +1150,7 @@
           <a:p>
             <a:fld id="{78F4CBAB-97FC-4A74-BBCB-0F18100BA447}" type="datetimeFigureOut">
               <a:rPr lang="en-US" smtClean="0"/>
-              <a:t>6/10/2024</a:t>
+              <a:t>8/28/2024</a:t>
             </a:fld>
             <a:endParaRPr lang="en-US"/>
           </a:p>
@@ -1414,7 +1415,7 @@
           <a:p>
             <a:fld id="{78F4CBAB-97FC-4A74-BBCB-0F18100BA447}" type="datetimeFigureOut">
               <a:rPr lang="en-US" smtClean="0"/>
-              <a:t>6/10/2024</a:t>
+              <a:t>8/28/2024</a:t>
             </a:fld>
             <a:endParaRPr lang="en-US"/>
           </a:p>
@@ -1826,7 +1827,7 @@
           <a:p>
             <a:fld id="{78F4CBAB-97FC-4A74-BBCB-0F18100BA447}" type="datetimeFigureOut">
               <a:rPr lang="en-US" smtClean="0"/>
-              <a:t>6/10/2024</a:t>
+              <a:t>8/28/2024</a:t>
             </a:fld>
             <a:endParaRPr lang="en-US"/>
           </a:p>
@@ -1967,7 +1968,7 @@
           <a:p>
             <a:fld id="{78F4CBAB-97FC-4A74-BBCB-0F18100BA447}" type="datetimeFigureOut">
               <a:rPr lang="en-US" smtClean="0"/>
-              <a:t>6/10/2024</a:t>
+              <a:t>8/28/2024</a:t>
             </a:fld>
             <a:endParaRPr lang="en-US"/>
           </a:p>
@@ -2080,7 +2081,7 @@
           <a:p>
             <a:fld id="{78F4CBAB-97FC-4A74-BBCB-0F18100BA447}" type="datetimeFigureOut">
               <a:rPr lang="en-US" smtClean="0"/>
-              <a:t>6/10/2024</a:t>
+              <a:t>8/28/2024</a:t>
             </a:fld>
             <a:endParaRPr lang="en-US"/>
           </a:p>
@@ -2391,7 +2392,7 @@
           <a:p>
             <a:fld id="{78F4CBAB-97FC-4A74-BBCB-0F18100BA447}" type="datetimeFigureOut">
               <a:rPr lang="en-US" smtClean="0"/>
-              <a:t>6/10/2024</a:t>
+              <a:t>8/28/2024</a:t>
             </a:fld>
             <a:endParaRPr lang="en-US"/>
           </a:p>
@@ -2679,7 +2680,7 @@
           <a:p>
             <a:fld id="{78F4CBAB-97FC-4A74-BBCB-0F18100BA447}" type="datetimeFigureOut">
               <a:rPr lang="en-US" smtClean="0"/>
-              <a:t>6/10/2024</a:t>
+              <a:t>8/28/2024</a:t>
             </a:fld>
             <a:endParaRPr lang="en-US"/>
           </a:p>
@@ -2920,7 +2921,7 @@
           <a:p>
             <a:fld id="{78F4CBAB-97FC-4A74-BBCB-0F18100BA447}" type="datetimeFigureOut">
               <a:rPr lang="en-US" smtClean="0"/>
-              <a:t>6/10/2024</a:t>
+              <a:t>8/28/2024</a:t>
             </a:fld>
             <a:endParaRPr lang="en-US"/>
           </a:p>
@@ -3339,10 +3340,10 @@
       </p:grpSpPr>
       <p:grpSp>
         <p:nvGrpSpPr>
-          <p:cNvPr id="8" name="Group 7">
-            <a:extLst>
-              <a:ext uri="{FF2B5EF4-FFF2-40B4-BE49-F238E27FC236}">
-                <a16:creationId xmlns:a16="http://schemas.microsoft.com/office/drawing/2014/main" id="{1F06B398-46B1-BF0E-8B08-EE7D0AFD3263}"/>
+          <p:cNvPr id="10" name="Group 9">
+            <a:extLst>
+              <a:ext uri="{FF2B5EF4-FFF2-40B4-BE49-F238E27FC236}">
+                <a16:creationId xmlns:a16="http://schemas.microsoft.com/office/drawing/2014/main" id="{6C139191-8C37-67FA-3978-CE054A317169}"/>
               </a:ext>
             </a:extLst>
           </p:cNvPr>
@@ -3352,62 +3353,118 @@
         <p:grpSpPr>
           <a:xfrm>
             <a:off x="529242" y="108152"/>
-            <a:ext cx="10994165" cy="6641695"/>
-            <a:chOff x="1096443" y="224328"/>
-            <a:chExt cx="7824120" cy="5029210"/>
+            <a:ext cx="10495456" cy="6641695"/>
+            <a:chOff x="529242" y="108152"/>
+            <a:chExt cx="10495456" cy="6641695"/>
           </a:xfrm>
         </p:grpSpPr>
-        <p:pic>
-          <p:nvPicPr>
-            <p:cNvPr id="5" name="Picture 4">
+        <p:grpSp>
+          <p:nvGrpSpPr>
+            <p:cNvPr id="3" name="Group 2">
               <a:extLst>
                 <a:ext uri="{FF2B5EF4-FFF2-40B4-BE49-F238E27FC236}">
-                  <a16:creationId xmlns:a16="http://schemas.microsoft.com/office/drawing/2014/main" id="{D47DE283-D403-8867-2B33-9720C49230F5}"/>
+                  <a16:creationId xmlns:a16="http://schemas.microsoft.com/office/drawing/2014/main" id="{7D6C5F5B-7F72-AC93-E0C9-F55BED229C5C}"/>
                 </a:ext>
               </a:extLst>
             </p:cNvPr>
-            <p:cNvPicPr>
-              <a:picLocks noChangeAspect="1"/>
-            </p:cNvPicPr>
+            <p:cNvGrpSpPr/>
             <p:nvPr/>
-          </p:nvPicPr>
-          <p:blipFill>
-            <a:blip r:embed="rId2">
-              <a:clrChange>
-                <a:clrFrom>
-                  <a:srgbClr val="FFFFFF"/>
-                </a:clrFrom>
-                <a:clrTo>
-                  <a:srgbClr val="FFFFFF">
-                    <a:alpha val="0"/>
-                  </a:srgbClr>
-                </a:clrTo>
-              </a:clrChange>
-              <a:extLst>
-                <a:ext uri="{28A0092B-C50C-407E-A947-70E740481C1C}">
-                  <a14:useLocalDpi xmlns:a14="http://schemas.microsoft.com/office/drawing/2010/main" val="0"/>
-                </a:ext>
-              </a:extLst>
-            </a:blip>
-            <a:srcRect/>
-            <a:stretch/>
-          </p:blipFill>
-          <p:spPr>
+          </p:nvGrpSpPr>
+          <p:grpSpPr>
             <a:xfrm>
-              <a:off x="1096443" y="224328"/>
-              <a:ext cx="6302182" cy="5029210"/>
+              <a:off x="529242" y="108152"/>
+              <a:ext cx="8933138" cy="6641695"/>
+              <a:chOff x="529242" y="108152"/>
+              <a:chExt cx="8933138" cy="6641695"/>
             </a:xfrm>
-            <a:prstGeom prst="rect">
-              <a:avLst/>
-            </a:prstGeom>
-          </p:spPr>
-        </p:pic>
+          </p:grpSpPr>
+          <p:pic>
+            <p:nvPicPr>
+              <p:cNvPr id="5" name="Picture 4">
+                <a:extLst>
+                  <a:ext uri="{FF2B5EF4-FFF2-40B4-BE49-F238E27FC236}">
+                    <a16:creationId xmlns:a16="http://schemas.microsoft.com/office/drawing/2014/main" id="{D47DE283-D403-8867-2B33-9720C49230F5}"/>
+                  </a:ext>
+                </a:extLst>
+              </p:cNvPr>
+              <p:cNvPicPr>
+                <a:picLocks noChangeAspect="1"/>
+              </p:cNvPicPr>
+              <p:nvPr/>
+            </p:nvPicPr>
+            <p:blipFill>
+              <a:blip r:embed="rId2">
+                <a:clrChange>
+                  <a:clrFrom>
+                    <a:srgbClr val="FFFFFF"/>
+                  </a:clrFrom>
+                  <a:clrTo>
+                    <a:srgbClr val="FFFFFF">
+                      <a:alpha val="0"/>
+                    </a:srgbClr>
+                  </a:clrTo>
+                </a:clrChange>
+                <a:extLst>
+                  <a:ext uri="{28A0092B-C50C-407E-A947-70E740481C1C}">
+                    <a14:useLocalDpi xmlns:a14="http://schemas.microsoft.com/office/drawing/2010/main" val="0"/>
+                  </a:ext>
+                </a:extLst>
+              </a:blip>
+              <a:srcRect/>
+              <a:stretch/>
+            </p:blipFill>
+            <p:spPr>
+              <a:xfrm>
+                <a:off x="529242" y="108152"/>
+                <a:ext cx="8855592" cy="6641695"/>
+              </a:xfrm>
+              <a:prstGeom prst="rect">
+                <a:avLst/>
+              </a:prstGeom>
+            </p:spPr>
+          </p:pic>
+          <p:sp>
+            <p:nvSpPr>
+              <p:cNvPr id="2" name="TextBox 1">
+                <a:extLst>
+                  <a:ext uri="{FF2B5EF4-FFF2-40B4-BE49-F238E27FC236}">
+                    <a16:creationId xmlns:a16="http://schemas.microsoft.com/office/drawing/2014/main" id="{2794FC12-E5A3-4AE7-8709-30E2F77801AB}"/>
+                  </a:ext>
+                </a:extLst>
+              </p:cNvPr>
+              <p:cNvSpPr txBox="1"/>
+              <p:nvPr/>
+            </p:nvSpPr>
+            <p:spPr>
+              <a:xfrm>
+                <a:off x="9307288" y="6363092"/>
+                <a:ext cx="155092" cy="276999"/>
+              </a:xfrm>
+              <a:prstGeom prst="rect">
+                <a:avLst/>
+              </a:prstGeom>
+              <a:noFill/>
+            </p:spPr>
+            <p:txBody>
+              <a:bodyPr wrap="square" rtlCol="0">
+                <a:spAutoFit/>
+              </a:bodyPr>
+              <a:lstStyle/>
+              <a:p>
+                <a:r>
+                  <a:rPr lang="en-US" sz="1200" dirty="0"/>
+                  <a:t>d</a:t>
+                </a:r>
+              </a:p>
+            </p:txBody>
+          </p:sp>
+        </p:grpSp>
         <p:pic>
           <p:nvPicPr>
-            <p:cNvPr id="7" name="Picture 6" descr="A screenshot of a computer&#10;&#10;Description automatically generated">
+            <p:cNvPr id="4" name="Picture 3">
               <a:extLst>
                 <a:ext uri="{FF2B5EF4-FFF2-40B4-BE49-F238E27FC236}">
-                  <a16:creationId xmlns:a16="http://schemas.microsoft.com/office/drawing/2014/main" id="{96A80E76-5B08-D624-3289-E5DFA9FD509D}"/>
+                  <a16:creationId xmlns:a16="http://schemas.microsoft.com/office/drawing/2014/main" id="{E2EE4FAC-01C4-FEC1-A581-E636649A0817}"/>
                 </a:ext>
               </a:extLst>
             </p:cNvPr>
@@ -3428,11 +3485,6 @@
                   </a:srgbClr>
                 </a:clrTo>
               </a:clrChange>
-              <a:extLst>
-                <a:ext uri="{28A0092B-C50C-407E-A947-70E740481C1C}">
-                  <a14:useLocalDpi xmlns:a14="http://schemas.microsoft.com/office/drawing/2010/main" val="0"/>
-                </a:ext>
-              </a:extLst>
             </a:blip>
             <a:stretch>
               <a:fillRect/>
@@ -3440,8 +3492,90 @@
           </p:blipFill>
           <p:spPr>
             <a:xfrm>
-              <a:off x="7381320" y="1229027"/>
-              <a:ext cx="1539243" cy="3019812"/>
+              <a:off x="9462380" y="1951178"/>
+              <a:ext cx="1562318" cy="752580"/>
+            </a:xfrm>
+            <a:prstGeom prst="rect">
+              <a:avLst/>
+            </a:prstGeom>
+          </p:spPr>
+        </p:pic>
+        <p:pic>
+          <p:nvPicPr>
+            <p:cNvPr id="6" name="Picture 5">
+              <a:extLst>
+                <a:ext uri="{FF2B5EF4-FFF2-40B4-BE49-F238E27FC236}">
+                  <a16:creationId xmlns:a16="http://schemas.microsoft.com/office/drawing/2014/main" id="{76EE420A-EF9B-F500-0F24-8C73EE0C5295}"/>
+                </a:ext>
+              </a:extLst>
+            </p:cNvPr>
+            <p:cNvPicPr>
+              <a:picLocks noChangeAspect="1"/>
+            </p:cNvPicPr>
+            <p:nvPr/>
+          </p:nvPicPr>
+          <p:blipFill>
+            <a:blip r:embed="rId4">
+              <a:clrChange>
+                <a:clrFrom>
+                  <a:srgbClr val="FFFFFF"/>
+                </a:clrFrom>
+                <a:clrTo>
+                  <a:srgbClr val="FFFFFF">
+                    <a:alpha val="0"/>
+                  </a:srgbClr>
+                </a:clrTo>
+              </a:clrChange>
+            </a:blip>
+            <a:stretch>
+              <a:fillRect/>
+            </a:stretch>
+          </p:blipFill>
+          <p:spPr>
+            <a:xfrm>
+              <a:off x="9462380" y="2860943"/>
+              <a:ext cx="1543265" cy="800212"/>
+            </a:xfrm>
+            <a:prstGeom prst="rect">
+              <a:avLst/>
+            </a:prstGeom>
+          </p:spPr>
+        </p:pic>
+        <p:pic>
+          <p:nvPicPr>
+            <p:cNvPr id="9" name="Picture 8">
+              <a:extLst>
+                <a:ext uri="{FF2B5EF4-FFF2-40B4-BE49-F238E27FC236}">
+                  <a16:creationId xmlns:a16="http://schemas.microsoft.com/office/drawing/2014/main" id="{52BEE628-F56C-A20E-FF59-429AC1693B42}"/>
+                </a:ext>
+              </a:extLst>
+            </p:cNvPr>
+            <p:cNvPicPr>
+              <a:picLocks noChangeAspect="1"/>
+            </p:cNvPicPr>
+            <p:nvPr/>
+          </p:nvPicPr>
+          <p:blipFill>
+            <a:blip r:embed="rId5">
+              <a:clrChange>
+                <a:clrFrom>
+                  <a:srgbClr val="FFFFFF"/>
+                </a:clrFrom>
+                <a:clrTo>
+                  <a:srgbClr val="FFFFFF">
+                    <a:alpha val="0"/>
+                  </a:srgbClr>
+                </a:clrTo>
+              </a:clrChange>
+            </a:blip>
+            <a:stretch>
+              <a:fillRect/>
+            </a:stretch>
+          </p:blipFill>
+          <p:spPr>
+            <a:xfrm>
+              <a:off x="9462380" y="3818340"/>
+              <a:ext cx="1381318" cy="876422"/>
             </a:xfrm>
             <a:prstGeom prst="rect">
               <a:avLst/>
@@ -3453,6 +3587,126 @@
     <p:extLst>
       <p:ext uri="{BB962C8B-B14F-4D97-AF65-F5344CB8AC3E}">
         <p14:creationId xmlns:p14="http://schemas.microsoft.com/office/powerpoint/2010/main" val="1685901977"/>
+      </p:ext>
+    </p:extLst>
+  </p:cSld>
+  <p:clrMapOvr>
+    <a:masterClrMapping/>
+  </p:clrMapOvr>
+</p:sld>
+</file>
+
+<file path=ppt/slides/slide2.xml><?xml version="1.0" encoding="utf-8"?>
+<p:sld xmlns:a="http://schemas.openxmlformats.org/drawingml/2006/main" xmlns:r="http://schemas.openxmlformats.org/officeDocument/2006/relationships" xmlns:p="http://schemas.openxmlformats.org/presentationml/2006/main">
+  <p:cSld>
+    <p:spTree>
+      <p:nvGrpSpPr>
+        <p:cNvPr id="1" name=""/>
+        <p:cNvGrpSpPr/>
+        <p:nvPr/>
+      </p:nvGrpSpPr>
+      <p:grpSpPr>
+        <a:xfrm>
+          <a:off x="0" y="0"/>
+          <a:ext cx="0" cy="0"/>
+          <a:chOff x="0" y="0"/>
+          <a:chExt cx="0" cy="0"/>
+        </a:xfrm>
+      </p:grpSpPr>
+      <p:pic>
+        <p:nvPicPr>
+          <p:cNvPr id="5" name="Picture 4">
+            <a:extLst>
+              <a:ext uri="{FF2B5EF4-FFF2-40B4-BE49-F238E27FC236}">
+                <a16:creationId xmlns:a16="http://schemas.microsoft.com/office/drawing/2014/main" id="{8DACF9E4-9AF4-E17E-CFC7-C2BCF65613A1}"/>
+              </a:ext>
+            </a:extLst>
+          </p:cNvPr>
+          <p:cNvPicPr>
+            <a:picLocks noChangeAspect="1"/>
+          </p:cNvPicPr>
+          <p:nvPr/>
+        </p:nvPicPr>
+        <p:blipFill>
+          <a:blip r:embed="rId2"/>
+          <a:stretch>
+            <a:fillRect/>
+          </a:stretch>
+        </p:blipFill>
+        <p:spPr>
+          <a:xfrm>
+            <a:off x="2292114" y="822693"/>
+            <a:ext cx="1562318" cy="752580"/>
+          </a:xfrm>
+          <a:prstGeom prst="rect">
+            <a:avLst/>
+          </a:prstGeom>
+        </p:spPr>
+      </p:pic>
+      <p:pic>
+        <p:nvPicPr>
+          <p:cNvPr id="7" name="Picture 6">
+            <a:extLst>
+              <a:ext uri="{FF2B5EF4-FFF2-40B4-BE49-F238E27FC236}">
+                <a16:creationId xmlns:a16="http://schemas.microsoft.com/office/drawing/2014/main" id="{51051DEB-1B2C-C2C3-9E99-C61D5AA093E1}"/>
+              </a:ext>
+            </a:extLst>
+          </p:cNvPr>
+          <p:cNvPicPr>
+            <a:picLocks noChangeAspect="1"/>
+          </p:cNvPicPr>
+          <p:nvPr/>
+        </p:nvPicPr>
+        <p:blipFill>
+          <a:blip r:embed="rId3"/>
+          <a:stretch>
+            <a:fillRect/>
+          </a:stretch>
+        </p:blipFill>
+        <p:spPr>
+          <a:xfrm>
+            <a:off x="2292114" y="1732458"/>
+            <a:ext cx="1543265" cy="800212"/>
+          </a:xfrm>
+          <a:prstGeom prst="rect">
+            <a:avLst/>
+          </a:prstGeom>
+        </p:spPr>
+      </p:pic>
+      <p:pic>
+        <p:nvPicPr>
+          <p:cNvPr id="9" name="Picture 8">
+            <a:extLst>
+              <a:ext uri="{FF2B5EF4-FFF2-40B4-BE49-F238E27FC236}">
+                <a16:creationId xmlns:a16="http://schemas.microsoft.com/office/drawing/2014/main" id="{3E09414A-BEDD-21A8-F175-78F04CCF74A1}"/>
+              </a:ext>
+            </a:extLst>
+          </p:cNvPr>
+          <p:cNvPicPr>
+            <a:picLocks noChangeAspect="1"/>
+          </p:cNvPicPr>
+          <p:nvPr/>
+        </p:nvPicPr>
+        <p:blipFill>
+          <a:blip r:embed="rId4"/>
+          <a:stretch>
+            <a:fillRect/>
+          </a:stretch>
+        </p:blipFill>
+        <p:spPr>
+          <a:xfrm>
+            <a:off x="2292114" y="2689855"/>
+            <a:ext cx="1381318" cy="876422"/>
+          </a:xfrm>
+          <a:prstGeom prst="rect">
+            <a:avLst/>
+          </a:prstGeom>
+        </p:spPr>
+      </p:pic>
+    </p:spTree>
+    <p:extLst>
+      <p:ext uri="{BB962C8B-B14F-4D97-AF65-F5344CB8AC3E}">
+        <p14:creationId xmlns:p14="http://schemas.microsoft.com/office/powerpoint/2010/main" val="3506174495"/>
       </p:ext>
     </p:extLst>
   </p:cSld>

</xml_diff>